<commit_message>
Add new lecture and images
</commit_message>
<xml_diff>
--- a/images/textbook-figures.pptx
+++ b/images/textbook-figures.pptx
@@ -10,6 +10,7 @@
     <p:sldId id="257" r:id="rId4"/>
     <p:sldId id="258" r:id="rId5"/>
     <p:sldId id="259" r:id="rId6"/>
+    <p:sldId id="261" r:id="rId7"/>
   </p:sldIdLst>
   <p:sldSz cx="12192000" cy="6858000"/>
   <p:notesSz cx="6858000" cy="9144000"/>
@@ -108,6 +109,11 @@
       </a:defRPr>
     </a:lvl9pPr>
   </p:defaultTextStyle>
+  <p:extLst>
+    <p:ext uri="{EFAFB233-063F-42B5-8137-9DF3F51BA10A}">
+      <p15:sldGuideLst xmlns:p15="http://schemas.microsoft.com/office/powerpoint/2012/main"/>
+    </p:ext>
+  </p:extLst>
 </p:presentation>
 </file>
 
@@ -258,7 +264,7 @@
           <a:p>
             <a:fld id="{49325BBA-0E10-9A4C-BC92-6F624D574C70}" type="datetimeFigureOut">
               <a:rPr lang="en-US" smtClean="0"/>
-              <a:t>12/20/23</a:t>
+              <a:t>2/9/24</a:t>
             </a:fld>
             <a:endParaRPr lang="en-US"/>
           </a:p>
@@ -456,7 +462,7 @@
           <a:p>
             <a:fld id="{49325BBA-0E10-9A4C-BC92-6F624D574C70}" type="datetimeFigureOut">
               <a:rPr lang="en-US" smtClean="0"/>
-              <a:t>12/20/23</a:t>
+              <a:t>2/9/24</a:t>
             </a:fld>
             <a:endParaRPr lang="en-US"/>
           </a:p>
@@ -664,7 +670,7 @@
           <a:p>
             <a:fld id="{49325BBA-0E10-9A4C-BC92-6F624D574C70}" type="datetimeFigureOut">
               <a:rPr lang="en-US" smtClean="0"/>
-              <a:t>12/20/23</a:t>
+              <a:t>2/9/24</a:t>
             </a:fld>
             <a:endParaRPr lang="en-US"/>
           </a:p>
@@ -862,7 +868,7 @@
           <a:p>
             <a:fld id="{49325BBA-0E10-9A4C-BC92-6F624D574C70}" type="datetimeFigureOut">
               <a:rPr lang="en-US" smtClean="0"/>
-              <a:t>12/20/23</a:t>
+              <a:t>2/9/24</a:t>
             </a:fld>
             <a:endParaRPr lang="en-US"/>
           </a:p>
@@ -1137,7 +1143,7 @@
           <a:p>
             <a:fld id="{49325BBA-0E10-9A4C-BC92-6F624D574C70}" type="datetimeFigureOut">
               <a:rPr lang="en-US" smtClean="0"/>
-              <a:t>12/20/23</a:t>
+              <a:t>2/9/24</a:t>
             </a:fld>
             <a:endParaRPr lang="en-US"/>
           </a:p>
@@ -1402,7 +1408,7 @@
           <a:p>
             <a:fld id="{49325BBA-0E10-9A4C-BC92-6F624D574C70}" type="datetimeFigureOut">
               <a:rPr lang="en-US" smtClean="0"/>
-              <a:t>12/20/23</a:t>
+              <a:t>2/9/24</a:t>
             </a:fld>
             <a:endParaRPr lang="en-US"/>
           </a:p>
@@ -1814,7 +1820,7 @@
           <a:p>
             <a:fld id="{49325BBA-0E10-9A4C-BC92-6F624D574C70}" type="datetimeFigureOut">
               <a:rPr lang="en-US" smtClean="0"/>
-              <a:t>12/20/23</a:t>
+              <a:t>2/9/24</a:t>
             </a:fld>
             <a:endParaRPr lang="en-US"/>
           </a:p>
@@ -1955,7 +1961,7 @@
           <a:p>
             <a:fld id="{49325BBA-0E10-9A4C-BC92-6F624D574C70}" type="datetimeFigureOut">
               <a:rPr lang="en-US" smtClean="0"/>
-              <a:t>12/20/23</a:t>
+              <a:t>2/9/24</a:t>
             </a:fld>
             <a:endParaRPr lang="en-US"/>
           </a:p>
@@ -2068,7 +2074,7 @@
           <a:p>
             <a:fld id="{49325BBA-0E10-9A4C-BC92-6F624D574C70}" type="datetimeFigureOut">
               <a:rPr lang="en-US" smtClean="0"/>
-              <a:t>12/20/23</a:t>
+              <a:t>2/9/24</a:t>
             </a:fld>
             <a:endParaRPr lang="en-US"/>
           </a:p>
@@ -2379,7 +2385,7 @@
           <a:p>
             <a:fld id="{49325BBA-0E10-9A4C-BC92-6F624D574C70}" type="datetimeFigureOut">
               <a:rPr lang="en-US" smtClean="0"/>
-              <a:t>12/20/23</a:t>
+              <a:t>2/9/24</a:t>
             </a:fld>
             <a:endParaRPr lang="en-US"/>
           </a:p>
@@ -2667,7 +2673,7 @@
           <a:p>
             <a:fld id="{49325BBA-0E10-9A4C-BC92-6F624D574C70}" type="datetimeFigureOut">
               <a:rPr lang="en-US" smtClean="0"/>
-              <a:t>12/20/23</a:t>
+              <a:t>2/9/24</a:t>
             </a:fld>
             <a:endParaRPr lang="en-US"/>
           </a:p>
@@ -2908,7 +2914,7 @@
           <a:p>
             <a:fld id="{49325BBA-0E10-9A4C-BC92-6F624D574C70}" type="datetimeFigureOut">
               <a:rPr lang="en-US" smtClean="0"/>
-              <a:t>12/20/23</a:t>
+              <a:t>2/9/24</a:t>
             </a:fld>
             <a:endParaRPr lang="en-US"/>
           </a:p>
@@ -3505,6 +3511,36 @@
           <a:chExt cx="0" cy="0"/>
         </a:xfrm>
       </p:grpSpPr>
+      <p:pic>
+        <p:nvPicPr>
+          <p:cNvPr id="2" name="Picture 1">
+            <a:extLst>
+              <a:ext uri="{FF2B5EF4-FFF2-40B4-BE49-F238E27FC236}">
+                <a16:creationId xmlns:a16="http://schemas.microsoft.com/office/drawing/2014/main" id="{F3F593FC-D9B2-3494-B3F5-31EDA9262B8C}"/>
+              </a:ext>
+            </a:extLst>
+          </p:cNvPr>
+          <p:cNvPicPr>
+            <a:picLocks noChangeAspect="1"/>
+          </p:cNvPicPr>
+          <p:nvPr/>
+        </p:nvPicPr>
+        <p:blipFill>
+          <a:blip r:embed="rId2"/>
+          <a:stretch>
+            <a:fillRect/>
+          </a:stretch>
+        </p:blipFill>
+        <p:spPr>
+          <a:xfrm>
+            <a:off x="3873500" y="1854200"/>
+            <a:ext cx="4445000" cy="3149600"/>
+          </a:xfrm>
+          <a:prstGeom prst="rect">
+            <a:avLst/>
+          </a:prstGeom>
+        </p:spPr>
+      </p:pic>
     </p:spTree>
     <p:extLst>
       <p:ext uri="{BB962C8B-B14F-4D97-AF65-F5344CB8AC3E}">
@@ -3535,10 +3571,156 @@
           <a:chExt cx="0" cy="0"/>
         </a:xfrm>
       </p:grpSpPr>
+      <p:grpSp>
+        <p:nvGrpSpPr>
+          <p:cNvPr id="9" name="Group 8">
+            <a:extLst>
+              <a:ext uri="{FF2B5EF4-FFF2-40B4-BE49-F238E27FC236}">
+                <a16:creationId xmlns:a16="http://schemas.microsoft.com/office/drawing/2014/main" id="{CBC98921-BD91-4FBC-3DCE-96598D4511F3}"/>
+              </a:ext>
+            </a:extLst>
+          </p:cNvPr>
+          <p:cNvGrpSpPr/>
+          <p:nvPr/>
+        </p:nvGrpSpPr>
+        <p:grpSpPr>
+          <a:xfrm>
+            <a:off x="1906925" y="816420"/>
+            <a:ext cx="7315200" cy="4942688"/>
+            <a:chOff x="1906925" y="816420"/>
+            <a:chExt cx="7315200" cy="4942688"/>
+          </a:xfrm>
+        </p:grpSpPr>
+        <p:sp>
+          <p:nvSpPr>
+            <p:cNvPr id="4" name="TextBox 3">
+              <a:extLst>
+                <a:ext uri="{FF2B5EF4-FFF2-40B4-BE49-F238E27FC236}">
+                  <a16:creationId xmlns:a16="http://schemas.microsoft.com/office/drawing/2014/main" id="{B9364699-2773-D750-B2F4-540D3CE12A98}"/>
+                </a:ext>
+              </a:extLst>
+            </p:cNvPr>
+            <p:cNvSpPr txBox="1"/>
+            <p:nvPr/>
+          </p:nvSpPr>
+          <p:spPr>
+            <a:xfrm>
+              <a:off x="6908664" y="5497498"/>
+              <a:ext cx="1824538" cy="261610"/>
+            </a:xfrm>
+            <a:prstGeom prst="rect">
+              <a:avLst/>
+            </a:prstGeom>
+            <a:noFill/>
+          </p:spPr>
+          <p:txBody>
+            <a:bodyPr wrap="none" rtlCol="0">
+              <a:spAutoFit/>
+            </a:bodyPr>
+            <a:lstStyle/>
+            <a:p>
+              <a:r>
+                <a:rPr lang="en-US" sz="1100" dirty="0"/>
+                <a:t>(http://ethen8181.github.io)</a:t>
+              </a:r>
+            </a:p>
+          </p:txBody>
+        </p:sp>
+        <p:pic>
+          <p:nvPicPr>
+            <p:cNvPr id="7" name="Picture 6">
+              <a:extLst>
+                <a:ext uri="{FF2B5EF4-FFF2-40B4-BE49-F238E27FC236}">
+                  <a16:creationId xmlns:a16="http://schemas.microsoft.com/office/drawing/2014/main" id="{B6B2A890-7238-AF93-4D2C-25527832C520}"/>
+                </a:ext>
+              </a:extLst>
+            </p:cNvPr>
+            <p:cNvPicPr>
+              <a:picLocks noChangeAspect="1"/>
+            </p:cNvPicPr>
+            <p:nvPr/>
+          </p:nvPicPr>
+          <p:blipFill>
+            <a:blip r:embed="rId2"/>
+            <a:stretch>
+              <a:fillRect/>
+            </a:stretch>
+          </p:blipFill>
+          <p:spPr>
+            <a:xfrm>
+              <a:off x="1906925" y="816420"/>
+              <a:ext cx="7315200" cy="4389120"/>
+            </a:xfrm>
+            <a:prstGeom prst="rect">
+              <a:avLst/>
+            </a:prstGeom>
+          </p:spPr>
+        </p:pic>
+      </p:grpSp>
     </p:spTree>
     <p:extLst>
       <p:ext uri="{BB962C8B-B14F-4D97-AF65-F5344CB8AC3E}">
         <p14:creationId xmlns:p14="http://schemas.microsoft.com/office/powerpoint/2010/main" val="3664700544"/>
+      </p:ext>
+    </p:extLst>
+  </p:cSld>
+  <p:clrMapOvr>
+    <a:masterClrMapping/>
+  </p:clrMapOvr>
+</p:sld>
+</file>
+
+<file path=ppt/slides/slide6.xml><?xml version="1.0" encoding="utf-8"?>
+<p:sld xmlns:a="http://schemas.openxmlformats.org/drawingml/2006/main" xmlns:r="http://schemas.openxmlformats.org/officeDocument/2006/relationships" xmlns:p="http://schemas.openxmlformats.org/presentationml/2006/main">
+  <p:cSld>
+    <p:spTree>
+      <p:nvGrpSpPr>
+        <p:cNvPr id="1" name=""/>
+        <p:cNvGrpSpPr/>
+        <p:nvPr/>
+      </p:nvGrpSpPr>
+      <p:grpSpPr>
+        <a:xfrm>
+          <a:off x="0" y="0"/>
+          <a:ext cx="0" cy="0"/>
+          <a:chOff x="0" y="0"/>
+          <a:chExt cx="0" cy="0"/>
+        </a:xfrm>
+      </p:grpSpPr>
+      <p:pic>
+        <p:nvPicPr>
+          <p:cNvPr id="3" name="Picture 2">
+            <a:extLst>
+              <a:ext uri="{FF2B5EF4-FFF2-40B4-BE49-F238E27FC236}">
+                <a16:creationId xmlns:a16="http://schemas.microsoft.com/office/drawing/2014/main" id="{ED718AAC-6DAE-46A6-FCEC-EC0E8076A67D}"/>
+              </a:ext>
+            </a:extLst>
+          </p:cNvPr>
+          <p:cNvPicPr>
+            <a:picLocks noChangeAspect="1"/>
+          </p:cNvPicPr>
+          <p:nvPr/>
+        </p:nvPicPr>
+        <p:blipFill>
+          <a:blip r:embed="rId2"/>
+          <a:stretch>
+            <a:fillRect/>
+          </a:stretch>
+        </p:blipFill>
+        <p:spPr>
+          <a:xfrm>
+            <a:off x="4187271" y="2024009"/>
+            <a:ext cx="4043043" cy="2652088"/>
+          </a:xfrm>
+          <a:prstGeom prst="rect">
+            <a:avLst/>
+          </a:prstGeom>
+        </p:spPr>
+      </p:pic>
+    </p:spTree>
+    <p:extLst>
+      <p:ext uri="{BB962C8B-B14F-4D97-AF65-F5344CB8AC3E}">
+        <p14:creationId xmlns:p14="http://schemas.microsoft.com/office/powerpoint/2010/main" val="2165286378"/>
       </p:ext>
     </p:extLst>
   </p:cSld>

</xml_diff>